<commit_message>
Schedule update to syllabus.
</commit_message>
<xml_diff>
--- a/Lecture Materials/C/4 - FunctionalAPI.pptx
+++ b/Lecture Materials/C/4 - FunctionalAPI.pptx
@@ -5,7 +5,7 @@
     <p:sldMasterId id="2147483648" r:id="rId1"/>
   </p:sldMasterIdLst>
   <p:notesMasterIdLst>
-    <p:notesMasterId r:id="rId20"/>
+    <p:notesMasterId r:id="rId19"/>
   </p:notesMasterIdLst>
   <p:sldIdLst>
     <p:sldId id="256" r:id="rId2"/>
@@ -21,11 +21,10 @@
     <p:sldId id="409" r:id="rId12"/>
     <p:sldId id="410" r:id="rId13"/>
     <p:sldId id="411" r:id="rId14"/>
-    <p:sldId id="414" r:id="rId15"/>
-    <p:sldId id="415" r:id="rId16"/>
-    <p:sldId id="416" r:id="rId17"/>
-    <p:sldId id="417" r:id="rId18"/>
-    <p:sldId id="413" r:id="rId19"/>
+    <p:sldId id="415" r:id="rId15"/>
+    <p:sldId id="416" r:id="rId16"/>
+    <p:sldId id="417" r:id="rId17"/>
+    <p:sldId id="413" r:id="rId18"/>
   </p:sldIdLst>
   <p:sldSz cx="12192000" cy="6858000"/>
   <p:notesSz cx="6858000" cy="9144000"/>
@@ -214,7 +213,7 @@
           <a:p>
             <a:fld id="{EFA659FB-0419-C24D-A6C0-9A1B475B1E65}" type="datetimeFigureOut">
               <a:rPr lang="en-US" smtClean="0"/>
-              <a:t>3/30/23</a:t>
+              <a:t>3/31/23</a:t>
             </a:fld>
             <a:endParaRPr lang="en-US"/>
           </a:p>
@@ -657,7 +656,7 @@
     </p:spTree>
     <p:extLst>
       <p:ext uri="{BB962C8B-B14F-4D97-AF65-F5344CB8AC3E}">
-        <p14:creationId xmlns:p14="http://schemas.microsoft.com/office/powerpoint/2010/main" val="3938390583"/>
+        <p14:creationId xmlns:p14="http://schemas.microsoft.com/office/powerpoint/2010/main" val="4210640059"/>
       </p:ext>
     </p:extLst>
   </p:cSld>
@@ -748,7 +747,7 @@
     </p:spTree>
     <p:extLst>
       <p:ext uri="{BB962C8B-B14F-4D97-AF65-F5344CB8AC3E}">
-        <p14:creationId xmlns:p14="http://schemas.microsoft.com/office/powerpoint/2010/main" val="4210640059"/>
+        <p14:creationId xmlns:p14="http://schemas.microsoft.com/office/powerpoint/2010/main" val="4183139836"/>
       </p:ext>
     </p:extLst>
   </p:cSld>
@@ -831,97 +830,6 @@
             <a:fld id="{E707AF2C-A832-324A-A13C-3791A9476477}" type="slidenum">
               <a:rPr lang="en-US" smtClean="0"/>
               <a:t>17</a:t>
-            </a:fld>
-            <a:endParaRPr lang="en-US"/>
-          </a:p>
-        </p:txBody>
-      </p:sp>
-    </p:spTree>
-    <p:extLst>
-      <p:ext uri="{BB962C8B-B14F-4D97-AF65-F5344CB8AC3E}">
-        <p14:creationId xmlns:p14="http://schemas.microsoft.com/office/powerpoint/2010/main" val="4183139836"/>
-      </p:ext>
-    </p:extLst>
-  </p:cSld>
-  <p:clrMapOvr>
-    <a:masterClrMapping/>
-  </p:clrMapOvr>
-</p:notes>
-</file>
-
-<file path=ppt/notesSlides/notesSlide13.xml><?xml version="1.0" encoding="utf-8"?>
-<p:notes xmlns:a="http://schemas.openxmlformats.org/drawingml/2006/main" xmlns:r="http://schemas.openxmlformats.org/officeDocument/2006/relationships" xmlns:p="http://schemas.openxmlformats.org/presentationml/2006/main">
-  <p:cSld>
-    <p:spTree>
-      <p:nvGrpSpPr>
-        <p:cNvPr id="1" name=""/>
-        <p:cNvGrpSpPr/>
-        <p:nvPr/>
-      </p:nvGrpSpPr>
-      <p:grpSpPr>
-        <a:xfrm>
-          <a:off x="0" y="0"/>
-          <a:ext cx="0" cy="0"/>
-          <a:chOff x="0" y="0"/>
-          <a:chExt cx="0" cy="0"/>
-        </a:xfrm>
-      </p:grpSpPr>
-      <p:sp>
-        <p:nvSpPr>
-          <p:cNvPr id="2" name="Slide Image Placeholder 1"/>
-          <p:cNvSpPr>
-            <a:spLocks noGrp="1" noRot="1" noChangeAspect="1"/>
-          </p:cNvSpPr>
-          <p:nvPr>
-            <p:ph type="sldImg"/>
-          </p:nvPr>
-        </p:nvSpPr>
-        <p:spPr/>
-      </p:sp>
-      <p:sp>
-        <p:nvSpPr>
-          <p:cNvPr id="3" name="Notes Placeholder 2"/>
-          <p:cNvSpPr>
-            <a:spLocks noGrp="1"/>
-          </p:cNvSpPr>
-          <p:nvPr>
-            <p:ph type="body" idx="1"/>
-          </p:nvPr>
-        </p:nvSpPr>
-        <p:spPr/>
-        <p:txBody>
-          <a:bodyPr/>
-          <a:lstStyle/>
-          <a:p>
-            <a:r>
-              <a:rPr lang="en-US" dirty="0"/>
-              <a:t>Weights are not initialized until you “build” the model (or compile it, which will </a:t>
-            </a:r>
-            <a:r>
-              <a:rPr lang="en-US"/>
-              <a:t>first build). </a:t>
-            </a:r>
-          </a:p>
-        </p:txBody>
-      </p:sp>
-      <p:sp>
-        <p:nvSpPr>
-          <p:cNvPr id="4" name="Slide Number Placeholder 3"/>
-          <p:cNvSpPr>
-            <a:spLocks noGrp="1"/>
-          </p:cNvSpPr>
-          <p:nvPr>
-            <p:ph type="sldNum" sz="quarter" idx="5"/>
-          </p:nvPr>
-        </p:nvSpPr>
-        <p:spPr/>
-        <p:txBody>
-          <a:bodyPr/>
-          <a:lstStyle/>
-          <a:p>
-            <a:fld id="{E707AF2C-A832-324A-A13C-3791A9476477}" type="slidenum">
-              <a:rPr lang="en-US" smtClean="0"/>
-              <a:t>18</a:t>
             </a:fld>
             <a:endParaRPr lang="en-US"/>
           </a:p>
@@ -1658,7 +1566,7 @@
     </p:spTree>
     <p:extLst>
       <p:ext uri="{BB962C8B-B14F-4D97-AF65-F5344CB8AC3E}">
-        <p14:creationId xmlns:p14="http://schemas.microsoft.com/office/powerpoint/2010/main" val="3036820535"/>
+        <p14:creationId xmlns:p14="http://schemas.microsoft.com/office/powerpoint/2010/main" val="3938390583"/>
       </p:ext>
     </p:extLst>
   </p:cSld>
@@ -2022,7 +1930,7 @@
           <a:p>
             <a:fld id="{87C2F797-6DFD-C74C-BA29-8B3CE1E6C725}" type="datetime1">
               <a:rPr lang="en-US" smtClean="0"/>
-              <a:t>3/30/23</a:t>
+              <a:t>3/31/23</a:t>
             </a:fld>
             <a:endParaRPr lang="en-US"/>
           </a:p>
@@ -2230,7 +2138,7 @@
           <a:p>
             <a:fld id="{64FE1960-B74B-0949-9DEF-CBE661CB7825}" type="datetime1">
               <a:rPr lang="en-US" smtClean="0"/>
-              <a:t>3/30/23</a:t>
+              <a:t>3/31/23</a:t>
             </a:fld>
             <a:endParaRPr lang="en-US"/>
           </a:p>
@@ -2428,7 +2336,7 @@
           <a:p>
             <a:fld id="{91871F70-41C7-F44D-9284-EB301E270CC7}" type="datetime1">
               <a:rPr lang="en-US" smtClean="0"/>
-              <a:t>3/30/23</a:t>
+              <a:t>3/31/23</a:t>
             </a:fld>
             <a:endParaRPr lang="en-US"/>
           </a:p>
@@ -2741,7 +2649,7 @@
           <a:p>
             <a:fld id="{E33F645A-02C2-AF41-9FDB-389E34E8B990}" type="datetime1">
               <a:rPr lang="en-US" smtClean="0"/>
-              <a:t>3/30/23</a:t>
+              <a:t>3/31/23</a:t>
             </a:fld>
             <a:endParaRPr lang="en-US"/>
           </a:p>
@@ -3006,7 +2914,7 @@
           <a:p>
             <a:fld id="{AB873A4C-DE8A-2F49-8ABE-1735EE515528}" type="datetime1">
               <a:rPr lang="en-US" smtClean="0"/>
-              <a:t>3/30/23</a:t>
+              <a:t>3/31/23</a:t>
             </a:fld>
             <a:endParaRPr lang="en-US"/>
           </a:p>
@@ -3418,7 +3326,7 @@
           <a:p>
             <a:fld id="{7DA13BA6-E929-9643-AF0C-C0B90BC6EAC0}" type="datetime1">
               <a:rPr lang="en-US" smtClean="0"/>
-              <a:t>3/30/23</a:t>
+              <a:t>3/31/23</a:t>
             </a:fld>
             <a:endParaRPr lang="en-US"/>
           </a:p>
@@ -3559,7 +3467,7 @@
           <a:p>
             <a:fld id="{1062371E-C5A0-7448-8CF8-A797D242C61D}" type="datetime1">
               <a:rPr lang="en-US" smtClean="0"/>
-              <a:t>3/30/23</a:t>
+              <a:t>3/31/23</a:t>
             </a:fld>
             <a:endParaRPr lang="en-US"/>
           </a:p>
@@ -3672,7 +3580,7 @@
           <a:p>
             <a:fld id="{33C9D714-59A4-C649-915B-E960BF4AC878}" type="datetime1">
               <a:rPr lang="en-US" smtClean="0"/>
-              <a:t>3/30/23</a:t>
+              <a:t>3/31/23</a:t>
             </a:fld>
             <a:endParaRPr lang="en-US"/>
           </a:p>
@@ -3983,7 +3891,7 @@
           <a:p>
             <a:fld id="{3951679C-160D-1F41-A3C3-54837256FB50}" type="datetime1">
               <a:rPr lang="en-US" smtClean="0"/>
-              <a:t>3/30/23</a:t>
+              <a:t>3/31/23</a:t>
             </a:fld>
             <a:endParaRPr lang="en-US"/>
           </a:p>
@@ -4271,7 +4179,7 @@
           <a:p>
             <a:fld id="{296B5A14-0E14-114B-AA5F-546D4BF7B2DC}" type="datetime1">
               <a:rPr lang="en-US" smtClean="0"/>
-              <a:t>3/30/23</a:t>
+              <a:t>3/31/23</a:t>
             </a:fld>
             <a:endParaRPr lang="en-US"/>
           </a:p>
@@ -4512,7 +4420,7 @@
           <a:p>
             <a:fld id="{1A75E9CF-B19A-3C42-99C1-DBC4AFBA0816}" type="datetime1">
               <a:rPr lang="en-US" smtClean="0"/>
-              <a:t>3/30/23</a:t>
+              <a:t>3/31/23</a:t>
             </a:fld>
             <a:endParaRPr lang="en-US"/>
           </a:p>
@@ -6057,198 +5965,6 @@
 <file path=ppt/slides/slide14.xml><?xml version="1.0" encoding="utf-8"?>
 <p:sld xmlns:a="http://schemas.openxmlformats.org/drawingml/2006/main" xmlns:r="http://schemas.openxmlformats.org/officeDocument/2006/relationships" xmlns:p="http://schemas.openxmlformats.org/presentationml/2006/main">
   <p:cSld>
-    <p:bg>
-      <p:bgPr>
-        <a:solidFill>
-          <a:srgbClr val="F7F7F7"/>
-        </a:solidFill>
-        <a:effectLst/>
-      </p:bgPr>
-    </p:bg>
-    <p:spTree>
-      <p:nvGrpSpPr>
-        <p:cNvPr id="1" name=""/>
-        <p:cNvGrpSpPr/>
-        <p:nvPr/>
-      </p:nvGrpSpPr>
-      <p:grpSpPr>
-        <a:xfrm>
-          <a:off x="0" y="0"/>
-          <a:ext cx="0" cy="0"/>
-          <a:chOff x="0" y="0"/>
-          <a:chExt cx="0" cy="0"/>
-        </a:xfrm>
-      </p:grpSpPr>
-      <p:sp>
-        <p:nvSpPr>
-          <p:cNvPr id="4" name="TextBox 3">
-            <a:extLst>
-              <a:ext uri="{FF2B5EF4-FFF2-40B4-BE49-F238E27FC236}">
-                <a16:creationId xmlns:a16="http://schemas.microsoft.com/office/drawing/2014/main" id="{2E4ACB90-5B23-AE45-9404-FED4FB5128EF}"/>
-              </a:ext>
-            </a:extLst>
-          </p:cNvPr>
-          <p:cNvSpPr txBox="1"/>
-          <p:nvPr/>
-        </p:nvSpPr>
-        <p:spPr>
-          <a:xfrm>
-            <a:off x="1551838" y="597212"/>
-            <a:ext cx="8690758" cy="923330"/>
-          </a:xfrm>
-          <a:prstGeom prst="rect">
-            <a:avLst/>
-          </a:prstGeom>
-          <a:noFill/>
-        </p:spPr>
-        <p:txBody>
-          <a:bodyPr wrap="square" rtlCol="0">
-            <a:spAutoFit/>
-          </a:bodyPr>
-          <a:lstStyle/>
-          <a:p>
-            <a:pPr algn="ctr"/>
-            <a:r>
-              <a:rPr lang="en-US" sz="5400" dirty="0">
-                <a:latin typeface="Economica" panose="02000506040000020004" pitchFamily="2" charset="77"/>
-              </a:rPr>
-              <a:t>Custom Loss Functions</a:t>
-            </a:r>
-          </a:p>
-        </p:txBody>
-      </p:sp>
-      <p:sp>
-        <p:nvSpPr>
-          <p:cNvPr id="9" name="TextBox 8">
-            <a:extLst>
-              <a:ext uri="{FF2B5EF4-FFF2-40B4-BE49-F238E27FC236}">
-                <a16:creationId xmlns:a16="http://schemas.microsoft.com/office/drawing/2014/main" id="{49992786-FA07-014E-900B-3DBD4BC05EAC}"/>
-              </a:ext>
-            </a:extLst>
-          </p:cNvPr>
-          <p:cNvSpPr txBox="1"/>
-          <p:nvPr/>
-        </p:nvSpPr>
-        <p:spPr>
-          <a:xfrm>
-            <a:off x="889036" y="1784529"/>
-            <a:ext cx="10016362" cy="2369880"/>
-          </a:xfrm>
-          <a:prstGeom prst="rect">
-            <a:avLst/>
-          </a:prstGeom>
-          <a:noFill/>
-        </p:spPr>
-        <p:txBody>
-          <a:bodyPr wrap="square" rtlCol="0">
-            <a:spAutoFit/>
-          </a:bodyPr>
-          <a:lstStyle/>
-          <a:p>
-            <a:r>
-              <a:rPr lang="en-US" sz="2000" b="1" dirty="0">
-                <a:latin typeface="Quicksand" pitchFamily="2" charset="77"/>
-              </a:rPr>
-              <a:t>We Can Write a Custom Loss Function</a:t>
-            </a:r>
-          </a:p>
-          <a:p>
-            <a:pPr marL="285750" indent="-285750">
-              <a:buFont typeface="Arial" panose="020B0604020202020204" pitchFamily="34" charset="0"/>
-              <a:buChar char="•"/>
-            </a:pPr>
-            <a:r>
-              <a:rPr lang="en-US" dirty="0"/>
-              <a:t>Many application-specific situations where we might want a custom metric (or loss function).</a:t>
-            </a:r>
-          </a:p>
-          <a:p>
-            <a:pPr marL="285750" indent="-285750">
-              <a:buFont typeface="Arial" panose="020B0604020202020204" pitchFamily="34" charset="0"/>
-              <a:buChar char="•"/>
-            </a:pPr>
-            <a:r>
-              <a:rPr lang="en-US" dirty="0"/>
-              <a:t>One example I will show you is image-sharpening – MSE or MAE are okay, but there are better metrics for image-wide alignment of pixel values. </a:t>
-            </a:r>
-          </a:p>
-          <a:p>
-            <a:pPr marL="285750" indent="-285750">
-              <a:buFont typeface="Arial" panose="020B0604020202020204" pitchFamily="34" charset="0"/>
-              <a:buChar char="•"/>
-            </a:pPr>
-            <a:endParaRPr lang="en-US" dirty="0"/>
-          </a:p>
-          <a:p>
-            <a:r>
-              <a:rPr lang="en-US" sz="2000" b="1" dirty="0">
-                <a:latin typeface="Quicksand" pitchFamily="2" charset="77"/>
-              </a:rPr>
-              <a:t>Function That Accepts Predicted and Actual as Input</a:t>
-            </a:r>
-          </a:p>
-          <a:p>
-            <a:pPr marL="285750" indent="-285750">
-              <a:buFont typeface="Arial" panose="020B0604020202020204" pitchFamily="34" charset="0"/>
-              <a:buChar char="•"/>
-            </a:pPr>
-            <a:endParaRPr lang="en-US" dirty="0"/>
-          </a:p>
-          <a:p>
-            <a:pPr marL="285750" indent="-285750">
-              <a:buFont typeface="Arial" panose="020B0604020202020204" pitchFamily="34" charset="0"/>
-              <a:buChar char="•"/>
-            </a:pPr>
-            <a:endParaRPr lang="en-US" dirty="0"/>
-          </a:p>
-        </p:txBody>
-      </p:sp>
-      <p:pic>
-        <p:nvPicPr>
-          <p:cNvPr id="2" name="Picture 1">
-            <a:extLst>
-              <a:ext uri="{FF2B5EF4-FFF2-40B4-BE49-F238E27FC236}">
-                <a16:creationId xmlns:a16="http://schemas.microsoft.com/office/drawing/2014/main" id="{138849FF-BA17-4445-B53C-6C0E66E64A43}"/>
-              </a:ext>
-            </a:extLst>
-          </p:cNvPr>
-          <p:cNvPicPr>
-            <a:picLocks noChangeAspect="1"/>
-          </p:cNvPicPr>
-          <p:nvPr/>
-        </p:nvPicPr>
-        <p:blipFill>
-          <a:blip r:embed="rId3"/>
-          <a:stretch>
-            <a:fillRect/>
-          </a:stretch>
-        </p:blipFill>
-        <p:spPr>
-          <a:xfrm>
-            <a:off x="2921000" y="4056651"/>
-            <a:ext cx="6350000" cy="1765300"/>
-          </a:xfrm>
-          <a:prstGeom prst="rect">
-            <a:avLst/>
-          </a:prstGeom>
-        </p:spPr>
-      </p:pic>
-    </p:spTree>
-    <p:extLst>
-      <p:ext uri="{BB962C8B-B14F-4D97-AF65-F5344CB8AC3E}">
-        <p14:creationId xmlns:p14="http://schemas.microsoft.com/office/powerpoint/2010/main" val="2133188331"/>
-      </p:ext>
-    </p:extLst>
-  </p:cSld>
-  <p:clrMapOvr>
-    <a:masterClrMapping/>
-  </p:clrMapOvr>
-</p:sld>
-</file>
-
-<file path=ppt/slides/slide15.xml><?xml version="1.0" encoding="utf-8"?>
-<p:sld xmlns:a="http://schemas.openxmlformats.org/drawingml/2006/main" xmlns:r="http://schemas.openxmlformats.org/officeDocument/2006/relationships" xmlns:p="http://schemas.openxmlformats.org/presentationml/2006/main">
-  <p:cSld>
     <p:spTree>
       <p:nvGrpSpPr>
         <p:cNvPr id="1" name=""/>
@@ -6408,7 +6124,7 @@
 </p:sld>
 </file>
 
-<file path=ppt/slides/slide16.xml><?xml version="1.0" encoding="utf-8"?>
+<file path=ppt/slides/slide15.xml><?xml version="1.0" encoding="utf-8"?>
 <p:sld xmlns:a="http://schemas.openxmlformats.org/drawingml/2006/main" xmlns:r="http://schemas.openxmlformats.org/officeDocument/2006/relationships" xmlns:p="http://schemas.openxmlformats.org/presentationml/2006/main">
   <p:cSld>
     <p:bg>
@@ -6677,7 +6393,7 @@
 </p:sld>
 </file>
 
-<file path=ppt/slides/slide17.xml><?xml version="1.0" encoding="utf-8"?>
+<file path=ppt/slides/slide16.xml><?xml version="1.0" encoding="utf-8"?>
 <p:sld xmlns:a="http://schemas.openxmlformats.org/drawingml/2006/main" xmlns:r="http://schemas.openxmlformats.org/officeDocument/2006/relationships" xmlns:p="http://schemas.openxmlformats.org/presentationml/2006/main">
   <p:cSld>
     <p:bg>
@@ -6924,7 +6640,7 @@
 </p:sld>
 </file>
 
-<file path=ppt/slides/slide18.xml><?xml version="1.0" encoding="utf-8"?>
+<file path=ppt/slides/slide17.xml><?xml version="1.0" encoding="utf-8"?>
 <p:sld xmlns:a="http://schemas.openxmlformats.org/drawingml/2006/main" xmlns:r="http://schemas.openxmlformats.org/officeDocument/2006/relationships" xmlns:p="http://schemas.openxmlformats.org/presentationml/2006/main">
   <p:cSld>
     <p:spTree>

</xml_diff>